<commit_message>
fixed margins on imageblocks with feedback partial after
</commit_message>
<xml_diff>
--- a/docs/assets/pages/files/governing-content/content-tasks-skills-workshop.pptx
+++ b/docs/assets/pages/files/governing-content/content-tasks-skills-workshop.pptx
@@ -1,6 +1,6 @@
 
 <file path=ppt/presentation.xml><?xml version="1.0" encoding="utf-8"?>
-<p:presentation xmlns:a="http://schemas.openxmlformats.org/drawingml/2006/main" xmlns:r="http://schemas.openxmlformats.org/officeDocument/2006/relationships" xmlns:p="http://schemas.openxmlformats.org/presentationml/2006/main" removePersonalInfoOnSave="1" strictFirstAndLastChars="0" embedTrueTypeFonts="1" saveSubsetFonts="1" autoCompressPictures="0">
+<p:presentation xmlns:a="http://schemas.openxmlformats.org/drawingml/2006/main" xmlns:r="http://schemas.openxmlformats.org/officeDocument/2006/relationships" xmlns:p="http://schemas.openxmlformats.org/presentationml/2006/main" removePersonalInfoOnSave="1" strictFirstAndLastChars="0" saveSubsetFonts="1" autoCompressPictures="0">
   <p:sldMasterIdLst>
     <p:sldMasterId id="2147483675" r:id="rId1"/>
     <p:sldMasterId id="2147483676" r:id="rId2"/>
@@ -36,29 +36,6 @@
   </p:sldIdLst>
   <p:sldSz cx="18288000" cy="10287000"/>
   <p:notesSz cx="6858000" cy="9144000"/>
-  <p:embeddedFontLst>
-    <p:embeddedFont>
-      <p:font typeface="Montserrat" panose="020B0604020202020204" charset="0"/>
-      <p:regular r:id="rId28"/>
-      <p:bold r:id="rId29"/>
-      <p:italic r:id="rId30"/>
-      <p:boldItalic r:id="rId31"/>
-    </p:embeddedFont>
-    <p:embeddedFont>
-      <p:font typeface="Helvetica Neue" panose="020B0604020202020204" charset="0"/>
-      <p:regular r:id="rId32"/>
-      <p:bold r:id="rId33"/>
-      <p:italic r:id="rId34"/>
-      <p:boldItalic r:id="rId35"/>
-    </p:embeddedFont>
-    <p:embeddedFont>
-      <p:font typeface="Calibri" panose="020F0502020204030204" pitchFamily="34" charset="0"/>
-      <p:regular r:id="rId36"/>
-      <p:bold r:id="rId37"/>
-      <p:italic r:id="rId38"/>
-      <p:boldItalic r:id="rId39"/>
-    </p:embeddedFont>
-  </p:embeddedFontLst>
   <p:defaultTextStyle>
     <a:defPPr marR="0" lvl="0" algn="l" rtl="0">
       <a:lnSpc>
@@ -16384,17 +16361,29 @@
               <a:buNone/>
             </a:pPr>
             <a:r>
-              <a:rPr lang="en" sz="2400">
-                <a:solidFill>
-                  <a:srgbClr val="919191"/>
+              <a:rPr lang="en" sz="2400" dirty="0" err="1">
+                <a:solidFill>
+                  <a:schemeClr val="tx1"/>
                 </a:solidFill>
                 <a:latin typeface="Montserrat"/>
                 <a:ea typeface="Montserrat"/>
                 <a:cs typeface="Montserrat"/>
                 <a:sym typeface="Montserrat"/>
               </a:rPr>
-              <a:t>MoGs or site-wide consolidation efforts are the only triggers for systematic archiving</a:t>
+              <a:t>MoGs</a:t>
             </a:r>
+            <a:r>
+              <a:rPr lang="en" sz="2400" dirty="0">
+                <a:solidFill>
+                  <a:schemeClr val="tx1"/>
+                </a:solidFill>
+                <a:latin typeface="Montserrat"/>
+                <a:ea typeface="Montserrat"/>
+                <a:cs typeface="Montserrat"/>
+                <a:sym typeface="Montserrat"/>
+              </a:rPr>
+              <a:t> or site-wide consolidation efforts are the only triggers for systematic archiving</a:t>
+            </a:r>
           </a:p>
           <a:p>
             <a:pPr marL="0" marR="0" lvl="0" indent="-69850" algn="l" rtl="0">
@@ -16413,7 +16402,7 @@
               <a:buFont typeface="Arial"/>
               <a:buNone/>
             </a:pPr>
-            <a:endParaRPr sz="2400">
+            <a:endParaRPr sz="2400" dirty="0">
               <a:solidFill>
                 <a:srgbClr val="919191"/>
               </a:solidFill>
@@ -16440,7 +16429,7 @@
               <a:buFont typeface="Helvetica Neue"/>
               <a:buNone/>
             </a:pPr>
-            <a:endParaRPr sz="2400">
+            <a:endParaRPr sz="2400" dirty="0">
               <a:solidFill>
                 <a:srgbClr val="919191"/>
               </a:solidFill>
@@ -18159,6 +18148,18 @@
               <a:buFont typeface="Arial"/>
               <a:buNone/>
             </a:pPr>
+            <a:r>
+              <a:rPr lang="en" sz="3600" dirty="0">
+                <a:solidFill>
+                  <a:srgbClr val="22A0CB"/>
+                </a:solidFill>
+                <a:latin typeface="Montserrat"/>
+                <a:ea typeface="Montserrat"/>
+                <a:cs typeface="Montserrat"/>
+                <a:sym typeface="Montserrat"/>
+              </a:rPr>
+              <a:t/>
+            </a:r>
             <a:br>
               <a:rPr lang="en" sz="3600" dirty="0">
                 <a:solidFill>
@@ -18398,7 +18399,139 @@
                 <a:cs typeface="Montserrat"/>
                 <a:sym typeface="Montserrat"/>
               </a:rPr>
-              <a:t> 				Accessible content 							writing, plain English, 						topic expertise, SEO, user 					needs, record keeping, 						etc.</a:t>
+              <a:t> 				Accessible content 							</a:t>
+            </a:r>
+            <a:r>
+              <a:rPr lang="en-AU" sz="3600" dirty="0" smtClean="0">
+                <a:solidFill>
+                  <a:srgbClr val="414141"/>
+                </a:solidFill>
+                <a:latin typeface="Montserrat"/>
+                <a:ea typeface="Montserrat"/>
+                <a:cs typeface="Montserrat"/>
+                <a:sym typeface="Montserrat"/>
+              </a:rPr>
+              <a:t>	</a:t>
+            </a:r>
+            <a:r>
+              <a:rPr lang="en" sz="3600" dirty="0" smtClean="0">
+                <a:solidFill>
+                  <a:srgbClr val="414141"/>
+                </a:solidFill>
+                <a:latin typeface="Montserrat"/>
+                <a:ea typeface="Montserrat"/>
+                <a:cs typeface="Montserrat"/>
+                <a:sym typeface="Montserrat"/>
+              </a:rPr>
+              <a:t>writing</a:t>
+            </a:r>
+            <a:r>
+              <a:rPr lang="en" sz="3600" dirty="0">
+                <a:solidFill>
+                  <a:srgbClr val="414141"/>
+                </a:solidFill>
+                <a:latin typeface="Montserrat"/>
+                <a:ea typeface="Montserrat"/>
+                <a:cs typeface="Montserrat"/>
+                <a:sym typeface="Montserrat"/>
+              </a:rPr>
+              <a:t>, plain English, 						</a:t>
+            </a:r>
+            <a:r>
+              <a:rPr lang="en-AU" sz="3600" dirty="0" smtClean="0">
+                <a:solidFill>
+                  <a:srgbClr val="414141"/>
+                </a:solidFill>
+                <a:latin typeface="Montserrat"/>
+                <a:ea typeface="Montserrat"/>
+                <a:cs typeface="Montserrat"/>
+                <a:sym typeface="Montserrat"/>
+              </a:rPr>
+              <a:t>	</a:t>
+            </a:r>
+            <a:r>
+              <a:rPr lang="en" sz="3600" dirty="0" smtClean="0">
+                <a:solidFill>
+                  <a:srgbClr val="414141"/>
+                </a:solidFill>
+                <a:latin typeface="Montserrat"/>
+                <a:ea typeface="Montserrat"/>
+                <a:cs typeface="Montserrat"/>
+                <a:sym typeface="Montserrat"/>
+              </a:rPr>
+              <a:t>topic </a:t>
+            </a:r>
+            <a:r>
+              <a:rPr lang="en" sz="3600" dirty="0">
+                <a:solidFill>
+                  <a:srgbClr val="414141"/>
+                </a:solidFill>
+                <a:latin typeface="Montserrat"/>
+                <a:ea typeface="Montserrat"/>
+                <a:cs typeface="Montserrat"/>
+                <a:sym typeface="Montserrat"/>
+              </a:rPr>
+              <a:t>expertise, SEO, user 					</a:t>
+            </a:r>
+            <a:r>
+              <a:rPr lang="en-AU" sz="3600" dirty="0" smtClean="0">
+                <a:solidFill>
+                  <a:srgbClr val="414141"/>
+                </a:solidFill>
+                <a:latin typeface="Montserrat"/>
+                <a:ea typeface="Montserrat"/>
+                <a:cs typeface="Montserrat"/>
+                <a:sym typeface="Montserrat"/>
+              </a:rPr>
+              <a:t>	</a:t>
+            </a:r>
+            <a:r>
+              <a:rPr lang="en" sz="3600" dirty="0" smtClean="0">
+                <a:solidFill>
+                  <a:srgbClr val="414141"/>
+                </a:solidFill>
+                <a:latin typeface="Montserrat"/>
+                <a:ea typeface="Montserrat"/>
+                <a:cs typeface="Montserrat"/>
+                <a:sym typeface="Montserrat"/>
+              </a:rPr>
+              <a:t>needs</a:t>
+            </a:r>
+            <a:r>
+              <a:rPr lang="en" sz="3600" dirty="0">
+                <a:solidFill>
+                  <a:srgbClr val="414141"/>
+                </a:solidFill>
+                <a:latin typeface="Montserrat"/>
+                <a:ea typeface="Montserrat"/>
+                <a:cs typeface="Montserrat"/>
+                <a:sym typeface="Montserrat"/>
+              </a:rPr>
+              <a:t>, record keeping, </a:t>
+            </a:r>
+            <a:r>
+              <a:rPr lang="en" sz="3600" dirty="0" smtClean="0">
+                <a:solidFill>
+                  <a:srgbClr val="414141"/>
+                </a:solidFill>
+                <a:latin typeface="Montserrat"/>
+                <a:ea typeface="Montserrat"/>
+                <a:cs typeface="Montserrat"/>
+                <a:sym typeface="Montserrat"/>
+              </a:rPr>
+              <a:t>etc</a:t>
+            </a:r>
+            <a:r>
+              <a:rPr lang="en" sz="3600" dirty="0">
+                <a:solidFill>
+                  <a:srgbClr val="414141"/>
+                </a:solidFill>
+                <a:latin typeface="Montserrat"/>
+                <a:ea typeface="Montserrat"/>
+                <a:cs typeface="Montserrat"/>
+                <a:sym typeface="Montserrat"/>
+              </a:rPr>
+              <a:t>.</a:t>
             </a:r>
           </a:p>
           <a:p>
@@ -19376,7 +19509,43 @@
                 <a:cs typeface="Montserrat"/>
                 <a:sym typeface="Montserrat"/>
               </a:rPr>
-              <a:t>			fact check.</a:t>
+              <a:t>			</a:t>
+            </a:r>
+            <a:r>
+              <a:rPr lang="en-AU" sz="3600" dirty="0" smtClean="0">
+                <a:solidFill>
+                  <a:srgbClr val="414141"/>
+                </a:solidFill>
+                <a:latin typeface="Montserrat"/>
+                <a:ea typeface="Montserrat"/>
+                <a:cs typeface="Montserrat"/>
+                <a:sym typeface="Montserrat"/>
+              </a:rPr>
+              <a:t>	</a:t>
+            </a:r>
+            <a:r>
+              <a:rPr lang="en" sz="3600" dirty="0" smtClean="0">
+                <a:solidFill>
+                  <a:srgbClr val="414141"/>
+                </a:solidFill>
+                <a:latin typeface="Montserrat"/>
+                <a:ea typeface="Montserrat"/>
+                <a:cs typeface="Montserrat"/>
+                <a:sym typeface="Montserrat"/>
+              </a:rPr>
+              <a:t>fact </a:t>
+            </a:r>
+            <a:r>
+              <a:rPr lang="en" sz="3600" dirty="0">
+                <a:solidFill>
+                  <a:srgbClr val="414141"/>
+                </a:solidFill>
+                <a:latin typeface="Montserrat"/>
+                <a:ea typeface="Montserrat"/>
+                <a:cs typeface="Montserrat"/>
+                <a:sym typeface="Montserrat"/>
+              </a:rPr>
+              <a:t>check.</a:t>
             </a:r>
           </a:p>
           <a:p>
@@ -19414,7 +19583,43 @@
                 <a:cs typeface="Montserrat"/>
                 <a:sym typeface="Montserrat"/>
               </a:rPr>
-              <a:t>  			produce in platform (accessibility, </a:t>
+              <a:t>  			</a:t>
+            </a:r>
+            <a:r>
+              <a:rPr lang="en-AU" sz="3600" dirty="0" smtClean="0">
+                <a:solidFill>
+                  <a:srgbClr val="414141"/>
+                </a:solidFill>
+                <a:latin typeface="Montserrat"/>
+                <a:ea typeface="Montserrat"/>
+                <a:cs typeface="Montserrat"/>
+                <a:sym typeface="Montserrat"/>
+              </a:rPr>
+              <a:t>	</a:t>
+            </a:r>
+            <a:r>
+              <a:rPr lang="en" sz="3600" dirty="0" smtClean="0">
+                <a:solidFill>
+                  <a:srgbClr val="414141"/>
+                </a:solidFill>
+                <a:latin typeface="Montserrat"/>
+                <a:ea typeface="Montserrat"/>
+                <a:cs typeface="Montserrat"/>
+                <a:sym typeface="Montserrat"/>
+              </a:rPr>
+              <a:t>produce </a:t>
+            </a:r>
+            <a:r>
+              <a:rPr lang="en" sz="3600" dirty="0">
+                <a:solidFill>
+                  <a:srgbClr val="414141"/>
+                </a:solidFill>
+                <a:latin typeface="Montserrat"/>
+                <a:ea typeface="Montserrat"/>
+                <a:cs typeface="Montserrat"/>
+                <a:sym typeface="Montserrat"/>
+              </a:rPr>
+              <a:t>in platform (accessibility, </a:t>
             </a:r>
             <a:br>
               <a:rPr lang="en" sz="3600" dirty="0">
@@ -19437,8 +19642,41 @@
                 <a:cs typeface="Montserrat"/>
                 <a:sym typeface="Montserrat"/>
               </a:rPr>
-              <a:t>					search engine optimisation, metrics). 						publish</a:t>
+              <a:t>					search engine optimisation, metrics). 						</a:t>
             </a:r>
+            <a:r>
+              <a:rPr lang="en-AU" sz="3600" dirty="0" smtClean="0">
+                <a:solidFill>
+                  <a:srgbClr val="414141"/>
+                </a:solidFill>
+                <a:latin typeface="Montserrat"/>
+                <a:ea typeface="Montserrat"/>
+                <a:cs typeface="Montserrat"/>
+                <a:sym typeface="Montserrat"/>
+              </a:rPr>
+              <a:t>		</a:t>
+            </a:r>
+            <a:r>
+              <a:rPr lang="en" sz="3600" dirty="0" smtClean="0">
+                <a:solidFill>
+                  <a:srgbClr val="414141"/>
+                </a:solidFill>
+                <a:latin typeface="Montserrat"/>
+                <a:ea typeface="Montserrat"/>
+                <a:cs typeface="Montserrat"/>
+                <a:sym typeface="Montserrat"/>
+              </a:rPr>
+              <a:t>publish</a:t>
+            </a:r>
+            <a:endParaRPr lang="en" sz="3600" dirty="0">
+              <a:solidFill>
+                <a:srgbClr val="414141"/>
+              </a:solidFill>
+              <a:latin typeface="Montserrat"/>
+              <a:ea typeface="Montserrat"/>
+              <a:cs typeface="Montserrat"/>
+              <a:sym typeface="Montserrat"/>
+            </a:endParaRPr>
           </a:p>
           <a:p>
             <a:pPr lvl="0" rtl="0">
@@ -19475,7 +19713,43 @@
                 <a:cs typeface="Montserrat"/>
                 <a:sym typeface="Montserrat"/>
               </a:rPr>
-              <a:t>			audit. analyse quality/quantity. revisit.</a:t>
+              <a:t>			</a:t>
+            </a:r>
+            <a:r>
+              <a:rPr lang="en-AU" sz="3600" dirty="0" smtClean="0">
+                <a:solidFill>
+                  <a:srgbClr val="414141"/>
+                </a:solidFill>
+                <a:latin typeface="Montserrat"/>
+                <a:ea typeface="Montserrat"/>
+                <a:cs typeface="Montserrat"/>
+                <a:sym typeface="Montserrat"/>
+              </a:rPr>
+              <a:t>	</a:t>
+            </a:r>
+            <a:r>
+              <a:rPr lang="en" sz="3600" dirty="0" smtClean="0">
+                <a:solidFill>
+                  <a:srgbClr val="414141"/>
+                </a:solidFill>
+                <a:latin typeface="Montserrat"/>
+                <a:ea typeface="Montserrat"/>
+                <a:cs typeface="Montserrat"/>
+                <a:sym typeface="Montserrat"/>
+              </a:rPr>
+              <a:t>audit</a:t>
+            </a:r>
+            <a:r>
+              <a:rPr lang="en" sz="3600" dirty="0">
+                <a:solidFill>
+                  <a:srgbClr val="414141"/>
+                </a:solidFill>
+                <a:latin typeface="Montserrat"/>
+                <a:ea typeface="Montserrat"/>
+                <a:cs typeface="Montserrat"/>
+                <a:sym typeface="Montserrat"/>
+              </a:rPr>
+              <a:t>. analyse quality/quantity. revisit.</a:t>
             </a:r>
           </a:p>
           <a:p>
@@ -20570,7 +20844,7 @@
               <a:buNone/>
             </a:pPr>
             <a:r>
-              <a:rPr lang="en" sz="3600">
+              <a:rPr lang="en" sz="3600" dirty="0">
                 <a:solidFill>
                   <a:srgbClr val="414141"/>
                 </a:solidFill>
@@ -20579,8 +20853,41 @@
                 <a:cs typeface="Montserrat"/>
                 <a:sym typeface="Montserrat"/>
               </a:rPr>
-              <a:t>Accessibility. Fact checking. Business analysis. Relationships. Editorial. User experience. Marketing. Communications. Web content analytics. Archiving. Auditing. CMS. Usability. Information architecture.</a:t>
+              <a:t>Accessibility. Fact checking. Business analysis. Relationships. Editorial. User experience. Marketing. Communications. Web content analytics. Archiving. Auditing. CMS. Usability. Information </a:t>
             </a:r>
+            <a:r>
+              <a:rPr lang="en" sz="3600" dirty="0" smtClean="0">
+                <a:solidFill>
+                  <a:srgbClr val="414141"/>
+                </a:solidFill>
+                <a:latin typeface="Montserrat"/>
+                <a:ea typeface="Montserrat"/>
+                <a:cs typeface="Montserrat"/>
+                <a:sym typeface="Montserrat"/>
+              </a:rPr>
+              <a:t>architecture</a:t>
+            </a:r>
+            <a:r>
+              <a:rPr lang="en-AU" sz="3600" dirty="0" smtClean="0">
+                <a:solidFill>
+                  <a:srgbClr val="414141"/>
+                </a:solidFill>
+                <a:latin typeface="Montserrat"/>
+                <a:ea typeface="Montserrat"/>
+                <a:cs typeface="Montserrat"/>
+                <a:sym typeface="Montserrat"/>
+              </a:rPr>
+              <a:t>, User research.</a:t>
+            </a:r>
+            <a:endParaRPr lang="en" sz="3600" dirty="0">
+              <a:solidFill>
+                <a:srgbClr val="414141"/>
+              </a:solidFill>
+              <a:latin typeface="Montserrat"/>
+              <a:ea typeface="Montserrat"/>
+              <a:cs typeface="Montserrat"/>
+              <a:sym typeface="Montserrat"/>
+            </a:endParaRPr>
           </a:p>
         </p:txBody>
       </p:sp>
@@ -21320,7 +21627,7 @@
               <a:buNone/>
             </a:pPr>
             <a:r>
-              <a:rPr lang="en" sz="3600">
+              <a:rPr lang="en" sz="3600" dirty="0">
                 <a:solidFill>
                   <a:srgbClr val="414141"/>
                 </a:solidFill>
@@ -21349,7 +21656,7 @@
               <a:buFont typeface="Arial"/>
               <a:buNone/>
             </a:pPr>
-            <a:endParaRPr sz="3600">
+            <a:endParaRPr sz="3600" dirty="0">
               <a:solidFill>
                 <a:srgbClr val="414141"/>
               </a:solidFill>
@@ -21378,7 +21685,7 @@
               <a:buNone/>
             </a:pPr>
             <a:r>
-              <a:rPr lang="en" sz="3600">
+              <a:rPr lang="en" sz="3600" dirty="0">
                 <a:solidFill>
                   <a:srgbClr val="414141"/>
                 </a:solidFill>
@@ -21407,7 +21714,7 @@
               <a:buFont typeface="Arial"/>
               <a:buNone/>
             </a:pPr>
-            <a:endParaRPr sz="3600">
+            <a:endParaRPr sz="3600" dirty="0">
               <a:solidFill>
                 <a:srgbClr val="414141"/>
               </a:solidFill>
@@ -21436,7 +21743,7 @@
               <a:buNone/>
             </a:pPr>
             <a:r>
-              <a:rPr lang="en" sz="3600">
+              <a:rPr lang="en" sz="3600" dirty="0">
                 <a:solidFill>
                   <a:srgbClr val="414141"/>
                 </a:solidFill>
@@ -21465,7 +21772,7 @@
               <a:buFont typeface="Arial"/>
               <a:buNone/>
             </a:pPr>
-            <a:endParaRPr sz="3600">
+            <a:endParaRPr sz="3600" dirty="0">
               <a:solidFill>
                 <a:srgbClr val="414141"/>
               </a:solidFill>
@@ -21492,7 +21799,7 @@
               <a:buFont typeface="Helvetica Neue"/>
               <a:buNone/>
             </a:pPr>
-            <a:endParaRPr sz="3600">
+            <a:endParaRPr sz="3600" dirty="0">
               <a:solidFill>
                 <a:srgbClr val="414141"/>
               </a:solidFill>
@@ -22324,13 +22631,18 @@
               <a:buNone/>
             </a:pPr>
             <a:r>
-              <a:rPr lang="en" sz="3000" b="1" dirty="0">
+              <a:rPr lang="en-AU" sz="3000" b="1" dirty="0" smtClean="0">
                 <a:solidFill>
                   <a:srgbClr val="FFFFFF"/>
                 </a:solidFill>
               </a:rPr>
-              <a:t>Archive</a:t>
+              <a:t>Remove</a:t>
             </a:r>
+            <a:endParaRPr lang="en" sz="3000" b="1" dirty="0">
+              <a:solidFill>
+                <a:srgbClr val="FFFFFF"/>
+              </a:solidFill>
+            </a:endParaRPr>
           </a:p>
         </p:txBody>
       </p:sp>
@@ -22781,7 +23093,7 @@
             <a:r>
               <a:rPr lang="en" sz="2400" dirty="0">
                 <a:solidFill>
-                  <a:srgbClr val="919191"/>
+                  <a:schemeClr val="tx1"/>
                 </a:solidFill>
                 <a:latin typeface="Montserrat"/>
                 <a:ea typeface="Montserrat"/>
@@ -22892,7 +23204,7 @@
             <a:r>
               <a:rPr lang="en" sz="2400" dirty="0">
                 <a:solidFill>
-                  <a:srgbClr val="919191"/>
+                  <a:schemeClr val="tx1"/>
                 </a:solidFill>
                 <a:latin typeface="Montserrat"/>
                 <a:ea typeface="Montserrat"/>
@@ -23001,9 +23313,9 @@
               <a:buNone/>
             </a:pPr>
             <a:r>
-              <a:rPr lang="en" sz="2400">
-                <a:solidFill>
-                  <a:srgbClr val="919191"/>
+              <a:rPr lang="en" sz="2400" dirty="0">
+                <a:solidFill>
+                  <a:schemeClr val="tx1"/>
                 </a:solidFill>
                 <a:latin typeface="Montserrat"/>
                 <a:ea typeface="Montserrat"/>
@@ -23030,7 +23342,7 @@
               <a:buFont typeface="Arial"/>
               <a:buNone/>
             </a:pPr>
-            <a:endParaRPr sz="2400">
+            <a:endParaRPr sz="2400" dirty="0">
               <a:solidFill>
                 <a:srgbClr val="919191"/>
               </a:solidFill>
@@ -23487,17 +23799,41 @@
               <a:buNone/>
             </a:pPr>
             <a:r>
-              <a:rPr lang="en" sz="2400">
-                <a:solidFill>
-                  <a:srgbClr val="919191"/>
+              <a:rPr lang="en" sz="2400" dirty="0">
+                <a:solidFill>
+                  <a:schemeClr val="tx1"/>
                 </a:solidFill>
                 <a:latin typeface="Montserrat"/>
                 <a:ea typeface="Montserrat"/>
                 <a:cs typeface="Montserrat"/>
                 <a:sym typeface="Montserrat"/>
               </a:rPr>
-              <a:t>Content is often lifted directly from legislation, policy or white papers without being optimised for web or audiences</a:t>
+              <a:t>Content is often lifted directly from legislation, policy or white papers without being </a:t>
             </a:r>
+            <a:r>
+              <a:rPr lang="en" sz="2400" dirty="0" err="1">
+                <a:solidFill>
+                  <a:schemeClr val="tx1"/>
+                </a:solidFill>
+                <a:latin typeface="Montserrat"/>
+                <a:ea typeface="Montserrat"/>
+                <a:cs typeface="Montserrat"/>
+                <a:sym typeface="Montserrat"/>
+              </a:rPr>
+              <a:t>optimised</a:t>
+            </a:r>
+            <a:r>
+              <a:rPr lang="en" sz="2400" dirty="0">
+                <a:solidFill>
+                  <a:schemeClr val="tx1"/>
+                </a:solidFill>
+                <a:latin typeface="Montserrat"/>
+                <a:ea typeface="Montserrat"/>
+                <a:cs typeface="Montserrat"/>
+                <a:sym typeface="Montserrat"/>
+              </a:rPr>
+              <a:t> for web or audiences</a:t>
+            </a:r>
           </a:p>
           <a:p>
             <a:pPr marL="0" marR="0" lvl="0" indent="-69850" algn="l" rtl="0">
@@ -23516,7 +23852,7 @@
               <a:buFont typeface="Arial"/>
               <a:buNone/>
             </a:pPr>
-            <a:endParaRPr sz="2400">
+            <a:endParaRPr sz="2400" dirty="0">
               <a:solidFill>
                 <a:srgbClr val="919191"/>
               </a:solidFill>
@@ -23543,7 +23879,7 @@
               <a:buFont typeface="Helvetica Neue"/>
               <a:buNone/>
             </a:pPr>
-            <a:endParaRPr sz="2400">
+            <a:endParaRPr sz="2400" dirty="0">
               <a:solidFill>
                 <a:srgbClr val="919191"/>
               </a:solidFill>
@@ -23598,9 +23934,9 @@
               <a:buNone/>
             </a:pPr>
             <a:r>
-              <a:rPr lang="en" sz="2400">
-                <a:solidFill>
-                  <a:srgbClr val="919191"/>
+              <a:rPr lang="en" sz="2400" dirty="0">
+                <a:solidFill>
+                  <a:schemeClr val="tx1"/>
                 </a:solidFill>
                 <a:latin typeface="Montserrat"/>
                 <a:ea typeface="Montserrat"/>
@@ -23627,7 +23963,7 @@
               <a:buFont typeface="Arial"/>
               <a:buNone/>
             </a:pPr>
-            <a:endParaRPr sz="2400">
+            <a:endParaRPr sz="2400" dirty="0">
               <a:solidFill>
                 <a:srgbClr val="919191"/>
               </a:solidFill>
@@ -23654,7 +23990,7 @@
               <a:buFont typeface="Helvetica Neue"/>
               <a:buNone/>
             </a:pPr>
-            <a:endParaRPr sz="2400">
+            <a:endParaRPr sz="2400" dirty="0">
               <a:solidFill>
                 <a:srgbClr val="919191"/>
               </a:solidFill>
@@ -23709,9 +24045,9 @@
               <a:buNone/>
             </a:pPr>
             <a:r>
-              <a:rPr lang="en" sz="2400">
-                <a:solidFill>
-                  <a:srgbClr val="919191"/>
+              <a:rPr lang="en" sz="2400" dirty="0">
+                <a:solidFill>
+                  <a:schemeClr val="tx1"/>
                 </a:solidFill>
                 <a:latin typeface="Montserrat"/>
                 <a:ea typeface="Montserrat"/>
@@ -23738,7 +24074,7 @@
               <a:buFont typeface="Arial"/>
               <a:buNone/>
             </a:pPr>
-            <a:endParaRPr sz="2400">
+            <a:endParaRPr sz="2400" dirty="0">
               <a:solidFill>
                 <a:srgbClr val="919191"/>
               </a:solidFill>
@@ -23765,7 +24101,7 @@
               <a:buFont typeface="Helvetica Neue"/>
               <a:buNone/>
             </a:pPr>
-            <a:endParaRPr sz="2400">
+            <a:endParaRPr sz="2400" dirty="0">
               <a:solidFill>
                 <a:srgbClr val="919191"/>
               </a:solidFill>
@@ -24141,9 +24477,9 @@
               <a:buNone/>
             </a:pPr>
             <a:r>
-              <a:rPr lang="en" sz="2400">
-                <a:solidFill>
-                  <a:srgbClr val="919191"/>
+              <a:rPr lang="en" sz="2400" dirty="0">
+                <a:solidFill>
+                  <a:schemeClr val="tx1"/>
                 </a:solidFill>
                 <a:latin typeface="Montserrat"/>
                 <a:ea typeface="Montserrat"/>
@@ -24170,7 +24506,7 @@
               <a:buFont typeface="Arial"/>
               <a:buNone/>
             </a:pPr>
-            <a:endParaRPr sz="2400">
+            <a:endParaRPr sz="2400" dirty="0">
               <a:solidFill>
                 <a:srgbClr val="919191"/>
               </a:solidFill>
@@ -24197,7 +24533,7 @@
               <a:buFont typeface="Helvetica Neue"/>
               <a:buNone/>
             </a:pPr>
-            <a:endParaRPr sz="2400">
+            <a:endParaRPr sz="2400" dirty="0">
               <a:solidFill>
                 <a:srgbClr val="919191"/>
               </a:solidFill>
@@ -24573,9 +24909,9 @@
               <a:buNone/>
             </a:pPr>
             <a:r>
-              <a:rPr lang="en" sz="2400">
-                <a:solidFill>
-                  <a:srgbClr val="919191"/>
+              <a:rPr lang="en" sz="2400" dirty="0">
+                <a:solidFill>
+                  <a:schemeClr val="tx1"/>
                 </a:solidFill>
                 <a:latin typeface="Montserrat"/>
                 <a:ea typeface="Montserrat"/>
@@ -24602,7 +24938,7 @@
               <a:buFont typeface="Arial"/>
               <a:buNone/>
             </a:pPr>
-            <a:endParaRPr sz="2400">
+            <a:endParaRPr sz="2400" dirty="0">
               <a:solidFill>
                 <a:srgbClr val="919191"/>
               </a:solidFill>
@@ -24629,7 +24965,7 @@
               <a:buFont typeface="Helvetica Neue"/>
               <a:buNone/>
             </a:pPr>
-            <a:endParaRPr sz="2400">
+            <a:endParaRPr sz="2400" dirty="0">
               <a:solidFill>
                 <a:srgbClr val="919191"/>
               </a:solidFill>
@@ -24684,9 +25020,9 @@
               <a:buNone/>
             </a:pPr>
             <a:r>
-              <a:rPr lang="en" sz="2400">
-                <a:solidFill>
-                  <a:srgbClr val="919191"/>
+              <a:rPr lang="en" sz="2400" dirty="0">
+                <a:solidFill>
+                  <a:schemeClr val="tx1"/>
                 </a:solidFill>
                 <a:latin typeface="Montserrat"/>
                 <a:ea typeface="Montserrat"/>
@@ -24713,7 +25049,7 @@
               <a:buFont typeface="Arial"/>
               <a:buNone/>
             </a:pPr>
-            <a:endParaRPr sz="2400">
+            <a:endParaRPr sz="2400" dirty="0">
               <a:solidFill>
                 <a:srgbClr val="919191"/>
               </a:solidFill>
@@ -24740,7 +25076,7 @@
               <a:buFont typeface="Helvetica Neue"/>
               <a:buNone/>
             </a:pPr>
-            <a:endParaRPr sz="2400">
+            <a:endParaRPr sz="2400" dirty="0">
               <a:solidFill>
                 <a:srgbClr val="919191"/>
               </a:solidFill>
@@ -24795,17 +25131,41 @@
               <a:buNone/>
             </a:pPr>
             <a:r>
-              <a:rPr lang="en" sz="2400">
-                <a:solidFill>
-                  <a:srgbClr val="919191"/>
+              <a:rPr lang="en" sz="2400" dirty="0">
+                <a:solidFill>
+                  <a:schemeClr val="tx1"/>
                 </a:solidFill>
                 <a:latin typeface="Montserrat"/>
                 <a:ea typeface="Montserrat"/>
                 <a:cs typeface="Montserrat"/>
                 <a:sym typeface="Montserrat"/>
               </a:rPr>
-              <a:t>Content ownership is often unclear due to staff departures, continually changing org structures and MoG changes</a:t>
+              <a:t>Content ownership is often unclear due to staff departures, continually changing org structures and </a:t>
             </a:r>
+            <a:r>
+              <a:rPr lang="en" sz="2400" dirty="0" err="1">
+                <a:solidFill>
+                  <a:schemeClr val="tx1"/>
+                </a:solidFill>
+                <a:latin typeface="Montserrat"/>
+                <a:ea typeface="Montserrat"/>
+                <a:cs typeface="Montserrat"/>
+                <a:sym typeface="Montserrat"/>
+              </a:rPr>
+              <a:t>MoG</a:t>
+            </a:r>
+            <a:r>
+              <a:rPr lang="en" sz="2400" dirty="0">
+                <a:solidFill>
+                  <a:schemeClr val="tx1"/>
+                </a:solidFill>
+                <a:latin typeface="Montserrat"/>
+                <a:ea typeface="Montserrat"/>
+                <a:cs typeface="Montserrat"/>
+                <a:sym typeface="Montserrat"/>
+              </a:rPr>
+              <a:t> changes</a:t>
+            </a:r>
           </a:p>
           <a:p>
             <a:pPr marL="0" marR="0" lvl="0" indent="-69850" algn="l" rtl="0">
@@ -24824,9 +25184,9 @@
               <a:buFont typeface="Arial"/>
               <a:buNone/>
             </a:pPr>
-            <a:endParaRPr sz="2400">
+            <a:endParaRPr sz="2400" dirty="0">
               <a:solidFill>
-                <a:srgbClr val="919191"/>
+                <a:schemeClr val="tx1"/>
               </a:solidFill>
               <a:latin typeface="Montserrat"/>
               <a:ea typeface="Montserrat"/>
@@ -24851,9 +25211,9 @@
               <a:buFont typeface="Arial"/>
               <a:buNone/>
             </a:pPr>
-            <a:endParaRPr sz="2400">
+            <a:endParaRPr sz="2400" dirty="0">
               <a:solidFill>
-                <a:srgbClr val="919191"/>
+                <a:schemeClr val="tx1"/>
               </a:solidFill>
               <a:latin typeface="Montserrat"/>
               <a:ea typeface="Montserrat"/>
@@ -24878,9 +25238,9 @@
               <a:buFont typeface="Helvetica Neue"/>
               <a:buNone/>
             </a:pPr>
-            <a:endParaRPr sz="2400">
+            <a:endParaRPr sz="2400" dirty="0">
               <a:solidFill>
-                <a:srgbClr val="919191"/>
+                <a:schemeClr val="tx1"/>
               </a:solidFill>
               <a:latin typeface="Montserrat"/>
               <a:ea typeface="Montserrat"/>
@@ -24933,9 +25293,9 @@
               <a:buNone/>
             </a:pPr>
             <a:r>
-              <a:rPr lang="en" sz="2400">
-                <a:solidFill>
-                  <a:srgbClr val="919191"/>
+              <a:rPr lang="en" sz="2400" dirty="0">
+                <a:solidFill>
+                  <a:schemeClr val="tx1"/>
                 </a:solidFill>
                 <a:latin typeface="Montserrat"/>
                 <a:ea typeface="Montserrat"/>
@@ -24962,7 +25322,7 @@
               <a:buFont typeface="Helvetica Neue"/>
               <a:buNone/>
             </a:pPr>
-            <a:endParaRPr sz="2400">
+            <a:endParaRPr sz="2400" dirty="0">
               <a:solidFill>
                 <a:srgbClr val="919191"/>
               </a:solidFill>

</xml_diff>